<commit_message>
following submission to AO journal
</commit_message>
<xml_diff>
--- a/papers/AppliedOptics_SpecialIssue_ModernImaging/images/figures_ppt.pptx
+++ b/papers/AppliedOptics_SpecialIssue_ModernImaging/images/figures_ppt.pptx
@@ -6,8 +6,9 @@
   </p:sldMasterIdLst>
   <p:sldIdLst>
     <p:sldId id="261" r:id="rId2"/>
-    <p:sldId id="262" r:id="rId3"/>
-    <p:sldId id="260" r:id="rId4"/>
+    <p:sldId id="263" r:id="rId3"/>
+    <p:sldId id="262" r:id="rId4"/>
+    <p:sldId id="260" r:id="rId5"/>
   </p:sldIdLst>
   <p:sldSz cx="5486400" cy="6858000"/>
   <p:notesSz cx="6858000" cy="9144000"/>
@@ -307,7 +308,7 @@
           <a:p>
             <a:fld id="{9D9501FF-ABFD-4A20-9D6D-E502A59752B5}" type="datetimeFigureOut">
               <a:rPr lang="en-US" smtClean="0"/>
-              <a:t>10/11/2016</a:t>
+              <a:t>10/15/2016</a:t>
             </a:fld>
             <a:endParaRPr lang="en-US"/>
           </a:p>
@@ -475,7 +476,7 @@
           <a:p>
             <a:fld id="{9D9501FF-ABFD-4A20-9D6D-E502A59752B5}" type="datetimeFigureOut">
               <a:rPr lang="en-US" smtClean="0"/>
-              <a:t>10/11/2016</a:t>
+              <a:t>10/15/2016</a:t>
             </a:fld>
             <a:endParaRPr lang="en-US"/>
           </a:p>
@@ -653,7 +654,7 @@
           <a:p>
             <a:fld id="{9D9501FF-ABFD-4A20-9D6D-E502A59752B5}" type="datetimeFigureOut">
               <a:rPr lang="en-US" smtClean="0"/>
-              <a:t>10/11/2016</a:t>
+              <a:t>10/15/2016</a:t>
             </a:fld>
             <a:endParaRPr lang="en-US"/>
           </a:p>
@@ -821,7 +822,7 @@
           <a:p>
             <a:fld id="{9D9501FF-ABFD-4A20-9D6D-E502A59752B5}" type="datetimeFigureOut">
               <a:rPr lang="en-US" smtClean="0"/>
-              <a:t>10/11/2016</a:t>
+              <a:t>10/15/2016</a:t>
             </a:fld>
             <a:endParaRPr lang="en-US"/>
           </a:p>
@@ -1066,7 +1067,7 @@
           <a:p>
             <a:fld id="{9D9501FF-ABFD-4A20-9D6D-E502A59752B5}" type="datetimeFigureOut">
               <a:rPr lang="en-US" smtClean="0"/>
-              <a:t>10/11/2016</a:t>
+              <a:t>10/15/2016</a:t>
             </a:fld>
             <a:endParaRPr lang="en-US"/>
           </a:p>
@@ -1295,7 +1296,7 @@
           <a:p>
             <a:fld id="{9D9501FF-ABFD-4A20-9D6D-E502A59752B5}" type="datetimeFigureOut">
               <a:rPr lang="en-US" smtClean="0"/>
-              <a:t>10/11/2016</a:t>
+              <a:t>10/15/2016</a:t>
             </a:fld>
             <a:endParaRPr lang="en-US"/>
           </a:p>
@@ -1659,7 +1660,7 @@
           <a:p>
             <a:fld id="{9D9501FF-ABFD-4A20-9D6D-E502A59752B5}" type="datetimeFigureOut">
               <a:rPr lang="en-US" smtClean="0"/>
-              <a:t>10/11/2016</a:t>
+              <a:t>10/15/2016</a:t>
             </a:fld>
             <a:endParaRPr lang="en-US"/>
           </a:p>
@@ -1776,7 +1777,7 @@
           <a:p>
             <a:fld id="{9D9501FF-ABFD-4A20-9D6D-E502A59752B5}" type="datetimeFigureOut">
               <a:rPr lang="en-US" smtClean="0"/>
-              <a:t>10/11/2016</a:t>
+              <a:t>10/15/2016</a:t>
             </a:fld>
             <a:endParaRPr lang="en-US"/>
           </a:p>
@@ -1871,7 +1872,7 @@
           <a:p>
             <a:fld id="{9D9501FF-ABFD-4A20-9D6D-E502A59752B5}" type="datetimeFigureOut">
               <a:rPr lang="en-US" smtClean="0"/>
-              <a:t>10/11/2016</a:t>
+              <a:t>10/15/2016</a:t>
             </a:fld>
             <a:endParaRPr lang="en-US"/>
           </a:p>
@@ -2146,7 +2147,7 @@
           <a:p>
             <a:fld id="{9D9501FF-ABFD-4A20-9D6D-E502A59752B5}" type="datetimeFigureOut">
               <a:rPr lang="en-US" smtClean="0"/>
-              <a:t>10/11/2016</a:t>
+              <a:t>10/15/2016</a:t>
             </a:fld>
             <a:endParaRPr lang="en-US"/>
           </a:p>
@@ -2401,7 +2402,7 @@
           <a:p>
             <a:fld id="{9D9501FF-ABFD-4A20-9D6D-E502A59752B5}" type="datetimeFigureOut">
               <a:rPr lang="en-US" smtClean="0"/>
-              <a:t>10/11/2016</a:t>
+              <a:t>10/15/2016</a:t>
             </a:fld>
             <a:endParaRPr lang="en-US"/>
           </a:p>
@@ -2612,7 +2613,7 @@
           <a:p>
             <a:fld id="{9D9501FF-ABFD-4A20-9D6D-E502A59752B5}" type="datetimeFigureOut">
               <a:rPr lang="en-US" smtClean="0"/>
-              <a:t>10/11/2016</a:t>
+              <a:t>10/15/2016</a:t>
             </a:fld>
             <a:endParaRPr lang="en-US"/>
           </a:p>
@@ -16138,6 +16139,2104 @@
       </p:grpSpPr>
       <p:grpSp>
         <p:nvGrpSpPr>
+          <p:cNvPr id="41" name="Group 40"/>
+          <p:cNvGrpSpPr/>
+          <p:nvPr/>
+        </p:nvGrpSpPr>
+        <p:grpSpPr>
+          <a:xfrm>
+            <a:off x="-181162" y="1076722"/>
+            <a:ext cx="6339643" cy="3324150"/>
+            <a:chOff x="-181162" y="1076722"/>
+            <a:chExt cx="6339643" cy="3324150"/>
+          </a:xfrm>
+        </p:grpSpPr>
+        <p:sp>
+          <p:nvSpPr>
+            <p:cNvPr id="11" name="Rectangle 10"/>
+            <p:cNvSpPr/>
+            <p:nvPr/>
+          </p:nvSpPr>
+          <p:spPr>
+            <a:xfrm>
+              <a:off x="-171716" y="1076722"/>
+              <a:ext cx="6287882" cy="3324150"/>
+            </a:xfrm>
+            <a:prstGeom prst="rect">
+              <a:avLst/>
+            </a:prstGeom>
+            <a:solidFill>
+              <a:schemeClr val="bg1"/>
+            </a:solidFill>
+            <a:ln>
+              <a:noFill/>
+            </a:ln>
+          </p:spPr>
+          <p:style>
+            <a:lnRef idx="2">
+              <a:schemeClr val="accent1">
+                <a:shade val="50000"/>
+              </a:schemeClr>
+            </a:lnRef>
+            <a:fillRef idx="1">
+              <a:schemeClr val="accent1"/>
+            </a:fillRef>
+            <a:effectRef idx="0">
+              <a:schemeClr val="accent1"/>
+            </a:effectRef>
+            <a:fontRef idx="minor">
+              <a:schemeClr val="lt1"/>
+            </a:fontRef>
+          </p:style>
+          <p:txBody>
+            <a:bodyPr rtlCol="0" anchor="ctr"/>
+            <a:lstStyle/>
+            <a:p>
+              <a:pPr algn="ctr"/>
+              <a:endParaRPr lang="en-US"/>
+            </a:p>
+          </p:txBody>
+        </p:sp>
+        <p:pic>
+          <p:nvPicPr>
+            <p:cNvPr id="3" name="Picture 2"/>
+            <p:cNvPicPr>
+              <a:picLocks noChangeAspect="1"/>
+            </p:cNvPicPr>
+            <p:nvPr/>
+          </p:nvPicPr>
+          <p:blipFill rotWithShape="1">
+            <a:blip r:embed="rId2"/>
+            <a:srcRect r="37937"/>
+            <a:stretch/>
+          </p:blipFill>
+          <p:spPr>
+            <a:xfrm>
+              <a:off x="2" y="1238250"/>
+              <a:ext cx="2010309" cy="1567404"/>
+            </a:xfrm>
+            <a:prstGeom prst="rect">
+              <a:avLst/>
+            </a:prstGeom>
+          </p:spPr>
+        </p:pic>
+        <p:pic>
+          <p:nvPicPr>
+            <p:cNvPr id="4" name="Picture 3"/>
+            <p:cNvPicPr>
+              <a:picLocks noChangeAspect="1"/>
+            </p:cNvPicPr>
+            <p:nvPr/>
+          </p:nvPicPr>
+          <p:blipFill rotWithShape="1">
+            <a:blip r:embed="rId3"/>
+            <a:srcRect l="1" r="37936"/>
+            <a:stretch/>
+          </p:blipFill>
+          <p:spPr>
+            <a:xfrm>
+              <a:off x="4105856" y="2845333"/>
+              <a:ext cx="2010309" cy="1555539"/>
+            </a:xfrm>
+            <a:prstGeom prst="rect">
+              <a:avLst/>
+            </a:prstGeom>
+          </p:spPr>
+        </p:pic>
+        <p:pic>
+          <p:nvPicPr>
+            <p:cNvPr id="5" name="Picture 4"/>
+            <p:cNvPicPr>
+              <a:picLocks noChangeAspect="1"/>
+            </p:cNvPicPr>
+            <p:nvPr/>
+          </p:nvPicPr>
+          <p:blipFill rotWithShape="1">
+            <a:blip r:embed="rId4"/>
+            <a:srcRect r="38011"/>
+            <a:stretch/>
+          </p:blipFill>
+          <p:spPr>
+            <a:xfrm>
+              <a:off x="2050848" y="2845333"/>
+              <a:ext cx="2007858" cy="1555539"/>
+            </a:xfrm>
+            <a:prstGeom prst="rect">
+              <a:avLst/>
+            </a:prstGeom>
+          </p:spPr>
+        </p:pic>
+        <p:pic>
+          <p:nvPicPr>
+            <p:cNvPr id="6" name="Picture 5"/>
+            <p:cNvPicPr>
+              <a:picLocks noChangeAspect="1"/>
+            </p:cNvPicPr>
+            <p:nvPr/>
+          </p:nvPicPr>
+          <p:blipFill rotWithShape="1">
+            <a:blip r:embed="rId5"/>
+            <a:srcRect r="38006"/>
+            <a:stretch/>
+          </p:blipFill>
+          <p:spPr>
+            <a:xfrm>
+              <a:off x="1131" y="2845333"/>
+              <a:ext cx="2008050" cy="1555539"/>
+            </a:xfrm>
+            <a:prstGeom prst="rect">
+              <a:avLst/>
+            </a:prstGeom>
+          </p:spPr>
+        </p:pic>
+        <p:pic>
+          <p:nvPicPr>
+            <p:cNvPr id="7" name="Picture 6"/>
+            <p:cNvPicPr>
+              <a:picLocks noChangeAspect="1"/>
+            </p:cNvPicPr>
+            <p:nvPr/>
+          </p:nvPicPr>
+          <p:blipFill rotWithShape="1">
+            <a:blip r:embed="rId6"/>
+            <a:srcRect l="1" r="37936"/>
+            <a:stretch/>
+          </p:blipFill>
+          <p:spPr>
+            <a:xfrm>
+              <a:off x="4105856" y="1238250"/>
+              <a:ext cx="2010311" cy="1567404"/>
+            </a:xfrm>
+            <a:prstGeom prst="rect">
+              <a:avLst/>
+            </a:prstGeom>
+          </p:spPr>
+        </p:pic>
+        <p:pic>
+          <p:nvPicPr>
+            <p:cNvPr id="8" name="Picture 7"/>
+            <p:cNvPicPr>
+              <a:picLocks noChangeAspect="1"/>
+            </p:cNvPicPr>
+            <p:nvPr/>
+          </p:nvPicPr>
+          <p:blipFill rotWithShape="1">
+            <a:blip r:embed="rId7"/>
+            <a:srcRect r="37937"/>
+            <a:stretch/>
+          </p:blipFill>
+          <p:spPr>
+            <a:xfrm>
+              <a:off x="2049623" y="1238250"/>
+              <a:ext cx="2010308" cy="1567404"/>
+            </a:xfrm>
+            <a:prstGeom prst="rect">
+              <a:avLst/>
+            </a:prstGeom>
+          </p:spPr>
+        </p:pic>
+        <p:sp>
+          <p:nvSpPr>
+            <p:cNvPr id="12" name="Rectangle 11"/>
+            <p:cNvSpPr/>
+            <p:nvPr/>
+          </p:nvSpPr>
+          <p:spPr>
+            <a:xfrm>
+              <a:off x="1866900" y="1588294"/>
+              <a:ext cx="114300" cy="104775"/>
+            </a:xfrm>
+            <a:prstGeom prst="rect">
+              <a:avLst/>
+            </a:prstGeom>
+            <a:solidFill>
+              <a:srgbClr val="343434"/>
+            </a:solidFill>
+            <a:ln>
+              <a:noFill/>
+            </a:ln>
+          </p:spPr>
+          <p:style>
+            <a:lnRef idx="2">
+              <a:schemeClr val="accent1">
+                <a:shade val="50000"/>
+              </a:schemeClr>
+            </a:lnRef>
+            <a:fillRef idx="1">
+              <a:schemeClr val="accent1"/>
+            </a:fillRef>
+            <a:effectRef idx="0">
+              <a:schemeClr val="accent1"/>
+            </a:effectRef>
+            <a:fontRef idx="minor">
+              <a:schemeClr val="lt1"/>
+            </a:fontRef>
+          </p:style>
+          <p:txBody>
+            <a:bodyPr rtlCol="0" anchor="ctr"/>
+            <a:lstStyle/>
+            <a:p>
+              <a:pPr algn="ctr"/>
+              <a:endParaRPr lang="en-US"/>
+            </a:p>
+          </p:txBody>
+        </p:sp>
+        <p:sp>
+          <p:nvSpPr>
+            <p:cNvPr id="13" name="Rectangle 12"/>
+            <p:cNvSpPr/>
+            <p:nvPr/>
+          </p:nvSpPr>
+          <p:spPr>
+            <a:xfrm>
+              <a:off x="1868967" y="2045494"/>
+              <a:ext cx="114300" cy="104775"/>
+            </a:xfrm>
+            <a:prstGeom prst="rect">
+              <a:avLst/>
+            </a:prstGeom>
+            <a:solidFill>
+              <a:srgbClr val="343434"/>
+            </a:solidFill>
+            <a:ln>
+              <a:noFill/>
+            </a:ln>
+          </p:spPr>
+          <p:style>
+            <a:lnRef idx="2">
+              <a:schemeClr val="accent1">
+                <a:shade val="50000"/>
+              </a:schemeClr>
+            </a:lnRef>
+            <a:fillRef idx="1">
+              <a:schemeClr val="accent1"/>
+            </a:fillRef>
+            <a:effectRef idx="0">
+              <a:schemeClr val="accent1"/>
+            </a:effectRef>
+            <a:fontRef idx="minor">
+              <a:schemeClr val="lt1"/>
+            </a:fontRef>
+          </p:style>
+          <p:txBody>
+            <a:bodyPr rtlCol="0" anchor="ctr"/>
+            <a:lstStyle/>
+            <a:p>
+              <a:pPr algn="ctr"/>
+              <a:endParaRPr lang="en-US"/>
+            </a:p>
+          </p:txBody>
+        </p:sp>
+        <p:sp>
+          <p:nvSpPr>
+            <p:cNvPr id="14" name="Rectangle 13"/>
+            <p:cNvSpPr/>
+            <p:nvPr/>
+          </p:nvSpPr>
+          <p:spPr>
+            <a:xfrm>
+              <a:off x="1866586" y="2509837"/>
+              <a:ext cx="114300" cy="104775"/>
+            </a:xfrm>
+            <a:prstGeom prst="rect">
+              <a:avLst/>
+            </a:prstGeom>
+            <a:solidFill>
+              <a:srgbClr val="343434"/>
+            </a:solidFill>
+            <a:ln>
+              <a:noFill/>
+            </a:ln>
+          </p:spPr>
+          <p:style>
+            <a:lnRef idx="2">
+              <a:schemeClr val="accent1">
+                <a:shade val="50000"/>
+              </a:schemeClr>
+            </a:lnRef>
+            <a:fillRef idx="1">
+              <a:schemeClr val="accent1"/>
+            </a:fillRef>
+            <a:effectRef idx="0">
+              <a:schemeClr val="accent1"/>
+            </a:effectRef>
+            <a:fontRef idx="minor">
+              <a:schemeClr val="lt1"/>
+            </a:fontRef>
+          </p:style>
+          <p:txBody>
+            <a:bodyPr rtlCol="0" anchor="ctr"/>
+            <a:lstStyle/>
+            <a:p>
+              <a:pPr algn="ctr"/>
+              <a:endParaRPr lang="en-US"/>
+            </a:p>
+          </p:txBody>
+        </p:sp>
+        <p:sp>
+          <p:nvSpPr>
+            <p:cNvPr id="15" name="Rectangle 14"/>
+            <p:cNvSpPr/>
+            <p:nvPr/>
+          </p:nvSpPr>
+          <p:spPr>
+            <a:xfrm>
+              <a:off x="1855823" y="3193798"/>
+              <a:ext cx="114300" cy="104775"/>
+            </a:xfrm>
+            <a:prstGeom prst="rect">
+              <a:avLst/>
+            </a:prstGeom>
+            <a:solidFill>
+              <a:srgbClr val="343434"/>
+            </a:solidFill>
+            <a:ln>
+              <a:noFill/>
+            </a:ln>
+          </p:spPr>
+          <p:style>
+            <a:lnRef idx="2">
+              <a:schemeClr val="accent1">
+                <a:shade val="50000"/>
+              </a:schemeClr>
+            </a:lnRef>
+            <a:fillRef idx="1">
+              <a:schemeClr val="accent1"/>
+            </a:fillRef>
+            <a:effectRef idx="0">
+              <a:schemeClr val="accent1"/>
+            </a:effectRef>
+            <a:fontRef idx="minor">
+              <a:schemeClr val="lt1"/>
+            </a:fontRef>
+          </p:style>
+          <p:txBody>
+            <a:bodyPr rtlCol="0" anchor="ctr"/>
+            <a:lstStyle/>
+            <a:p>
+              <a:pPr algn="ctr"/>
+              <a:endParaRPr lang="en-US"/>
+            </a:p>
+          </p:txBody>
+        </p:sp>
+        <p:sp>
+          <p:nvSpPr>
+            <p:cNvPr id="16" name="Rectangle 15"/>
+            <p:cNvSpPr/>
+            <p:nvPr/>
+          </p:nvSpPr>
+          <p:spPr>
+            <a:xfrm>
+              <a:off x="3920968" y="1585912"/>
+              <a:ext cx="114300" cy="104775"/>
+            </a:xfrm>
+            <a:prstGeom prst="rect">
+              <a:avLst/>
+            </a:prstGeom>
+            <a:solidFill>
+              <a:srgbClr val="343434"/>
+            </a:solidFill>
+            <a:ln>
+              <a:noFill/>
+            </a:ln>
+          </p:spPr>
+          <p:style>
+            <a:lnRef idx="2">
+              <a:schemeClr val="accent1">
+                <a:shade val="50000"/>
+              </a:schemeClr>
+            </a:lnRef>
+            <a:fillRef idx="1">
+              <a:schemeClr val="accent1"/>
+            </a:fillRef>
+            <a:effectRef idx="0">
+              <a:schemeClr val="accent1"/>
+            </a:effectRef>
+            <a:fontRef idx="minor">
+              <a:schemeClr val="lt1"/>
+            </a:fontRef>
+          </p:style>
+          <p:txBody>
+            <a:bodyPr rtlCol="0" anchor="ctr"/>
+            <a:lstStyle/>
+            <a:p>
+              <a:pPr algn="ctr"/>
+              <a:endParaRPr lang="en-US"/>
+            </a:p>
+          </p:txBody>
+        </p:sp>
+        <p:sp>
+          <p:nvSpPr>
+            <p:cNvPr id="17" name="Rectangle 16"/>
+            <p:cNvSpPr/>
+            <p:nvPr/>
+          </p:nvSpPr>
+          <p:spPr>
+            <a:xfrm>
+              <a:off x="3918587" y="2045493"/>
+              <a:ext cx="114300" cy="104775"/>
+            </a:xfrm>
+            <a:prstGeom prst="rect">
+              <a:avLst/>
+            </a:prstGeom>
+            <a:solidFill>
+              <a:srgbClr val="343434"/>
+            </a:solidFill>
+            <a:ln>
+              <a:noFill/>
+            </a:ln>
+          </p:spPr>
+          <p:style>
+            <a:lnRef idx="2">
+              <a:schemeClr val="accent1">
+                <a:shade val="50000"/>
+              </a:schemeClr>
+            </a:lnRef>
+            <a:fillRef idx="1">
+              <a:schemeClr val="accent1"/>
+            </a:fillRef>
+            <a:effectRef idx="0">
+              <a:schemeClr val="accent1"/>
+            </a:effectRef>
+            <a:fontRef idx="minor">
+              <a:schemeClr val="lt1"/>
+            </a:fontRef>
+          </p:style>
+          <p:txBody>
+            <a:bodyPr rtlCol="0" anchor="ctr"/>
+            <a:lstStyle/>
+            <a:p>
+              <a:pPr algn="ctr"/>
+              <a:endParaRPr lang="en-US"/>
+            </a:p>
+          </p:txBody>
+        </p:sp>
+        <p:sp>
+          <p:nvSpPr>
+            <p:cNvPr id="18" name="Rectangle 17"/>
+            <p:cNvSpPr/>
+            <p:nvPr/>
+          </p:nvSpPr>
+          <p:spPr>
+            <a:xfrm>
+              <a:off x="3911444" y="2509837"/>
+              <a:ext cx="114300" cy="104775"/>
+            </a:xfrm>
+            <a:prstGeom prst="rect">
+              <a:avLst/>
+            </a:prstGeom>
+            <a:solidFill>
+              <a:srgbClr val="343434"/>
+            </a:solidFill>
+            <a:ln>
+              <a:noFill/>
+            </a:ln>
+          </p:spPr>
+          <p:style>
+            <a:lnRef idx="2">
+              <a:schemeClr val="accent1">
+                <a:shade val="50000"/>
+              </a:schemeClr>
+            </a:lnRef>
+            <a:fillRef idx="1">
+              <a:schemeClr val="accent1"/>
+            </a:fillRef>
+            <a:effectRef idx="0">
+              <a:schemeClr val="accent1"/>
+            </a:effectRef>
+            <a:fontRef idx="minor">
+              <a:schemeClr val="lt1"/>
+            </a:fontRef>
+          </p:style>
+          <p:txBody>
+            <a:bodyPr rtlCol="0" anchor="ctr"/>
+            <a:lstStyle/>
+            <a:p>
+              <a:pPr algn="ctr"/>
+              <a:endParaRPr lang="en-US"/>
+            </a:p>
+          </p:txBody>
+        </p:sp>
+        <p:sp>
+          <p:nvSpPr>
+            <p:cNvPr id="19" name="Rectangle 18"/>
+            <p:cNvSpPr/>
+            <p:nvPr/>
+          </p:nvSpPr>
+          <p:spPr>
+            <a:xfrm>
+              <a:off x="5975988" y="1585911"/>
+              <a:ext cx="114300" cy="104775"/>
+            </a:xfrm>
+            <a:prstGeom prst="rect">
+              <a:avLst/>
+            </a:prstGeom>
+            <a:solidFill>
+              <a:srgbClr val="343434"/>
+            </a:solidFill>
+            <a:ln>
+              <a:noFill/>
+            </a:ln>
+          </p:spPr>
+          <p:style>
+            <a:lnRef idx="2">
+              <a:schemeClr val="accent1">
+                <a:shade val="50000"/>
+              </a:schemeClr>
+            </a:lnRef>
+            <a:fillRef idx="1">
+              <a:schemeClr val="accent1"/>
+            </a:fillRef>
+            <a:effectRef idx="0">
+              <a:schemeClr val="accent1"/>
+            </a:effectRef>
+            <a:fontRef idx="minor">
+              <a:schemeClr val="lt1"/>
+            </a:fontRef>
+          </p:style>
+          <p:txBody>
+            <a:bodyPr rtlCol="0" anchor="ctr"/>
+            <a:lstStyle/>
+            <a:p>
+              <a:pPr algn="ctr"/>
+              <a:endParaRPr lang="en-US"/>
+            </a:p>
+          </p:txBody>
+        </p:sp>
+        <p:sp>
+          <p:nvSpPr>
+            <p:cNvPr id="20" name="Rectangle 19"/>
+            <p:cNvSpPr/>
+            <p:nvPr/>
+          </p:nvSpPr>
+          <p:spPr>
+            <a:xfrm>
+              <a:off x="5974821" y="2045493"/>
+              <a:ext cx="114300" cy="104775"/>
+            </a:xfrm>
+            <a:prstGeom prst="rect">
+              <a:avLst/>
+            </a:prstGeom>
+            <a:solidFill>
+              <a:srgbClr val="343434"/>
+            </a:solidFill>
+            <a:ln>
+              <a:noFill/>
+            </a:ln>
+          </p:spPr>
+          <p:style>
+            <a:lnRef idx="2">
+              <a:schemeClr val="accent1">
+                <a:shade val="50000"/>
+              </a:schemeClr>
+            </a:lnRef>
+            <a:fillRef idx="1">
+              <a:schemeClr val="accent1"/>
+            </a:fillRef>
+            <a:effectRef idx="0">
+              <a:schemeClr val="accent1"/>
+            </a:effectRef>
+            <a:fontRef idx="minor">
+              <a:schemeClr val="lt1"/>
+            </a:fontRef>
+          </p:style>
+          <p:txBody>
+            <a:bodyPr rtlCol="0" anchor="ctr"/>
+            <a:lstStyle/>
+            <a:p>
+              <a:pPr algn="ctr"/>
+              <a:endParaRPr lang="en-US"/>
+            </a:p>
+          </p:txBody>
+        </p:sp>
+        <p:sp>
+          <p:nvSpPr>
+            <p:cNvPr id="21" name="Rectangle 20"/>
+            <p:cNvSpPr/>
+            <p:nvPr/>
+          </p:nvSpPr>
+          <p:spPr>
+            <a:xfrm>
+              <a:off x="5967678" y="2509837"/>
+              <a:ext cx="114300" cy="104775"/>
+            </a:xfrm>
+            <a:prstGeom prst="rect">
+              <a:avLst/>
+            </a:prstGeom>
+            <a:solidFill>
+              <a:srgbClr val="343434"/>
+            </a:solidFill>
+            <a:ln>
+              <a:noFill/>
+            </a:ln>
+          </p:spPr>
+          <p:style>
+            <a:lnRef idx="2">
+              <a:schemeClr val="accent1">
+                <a:shade val="50000"/>
+              </a:schemeClr>
+            </a:lnRef>
+            <a:fillRef idx="1">
+              <a:schemeClr val="accent1"/>
+            </a:fillRef>
+            <a:effectRef idx="0">
+              <a:schemeClr val="accent1"/>
+            </a:effectRef>
+            <a:fontRef idx="minor">
+              <a:schemeClr val="lt1"/>
+            </a:fontRef>
+          </p:style>
+          <p:txBody>
+            <a:bodyPr rtlCol="0" anchor="ctr"/>
+            <a:lstStyle/>
+            <a:p>
+              <a:pPr algn="ctr"/>
+              <a:endParaRPr lang="en-US"/>
+            </a:p>
+          </p:txBody>
+        </p:sp>
+        <p:sp>
+          <p:nvSpPr>
+            <p:cNvPr id="22" name="Rectangle 21"/>
+            <p:cNvSpPr/>
+            <p:nvPr/>
+          </p:nvSpPr>
+          <p:spPr>
+            <a:xfrm>
+              <a:off x="5959002" y="3193797"/>
+              <a:ext cx="114300" cy="104775"/>
+            </a:xfrm>
+            <a:prstGeom prst="rect">
+              <a:avLst/>
+            </a:prstGeom>
+            <a:solidFill>
+              <a:srgbClr val="343434"/>
+            </a:solidFill>
+            <a:ln>
+              <a:noFill/>
+            </a:ln>
+          </p:spPr>
+          <p:style>
+            <a:lnRef idx="2">
+              <a:schemeClr val="accent1">
+                <a:shade val="50000"/>
+              </a:schemeClr>
+            </a:lnRef>
+            <a:fillRef idx="1">
+              <a:schemeClr val="accent1"/>
+            </a:fillRef>
+            <a:effectRef idx="0">
+              <a:schemeClr val="accent1"/>
+            </a:effectRef>
+            <a:fontRef idx="minor">
+              <a:schemeClr val="lt1"/>
+            </a:fontRef>
+          </p:style>
+          <p:txBody>
+            <a:bodyPr rtlCol="0" anchor="ctr"/>
+            <a:lstStyle/>
+            <a:p>
+              <a:pPr algn="ctr"/>
+              <a:endParaRPr lang="en-US"/>
+            </a:p>
+          </p:txBody>
+        </p:sp>
+        <p:sp>
+          <p:nvSpPr>
+            <p:cNvPr id="23" name="Rectangle 22"/>
+            <p:cNvSpPr/>
+            <p:nvPr/>
+          </p:nvSpPr>
+          <p:spPr>
+            <a:xfrm>
+              <a:off x="3903925" y="3191416"/>
+              <a:ext cx="114300" cy="104775"/>
+            </a:xfrm>
+            <a:prstGeom prst="rect">
+              <a:avLst/>
+            </a:prstGeom>
+            <a:solidFill>
+              <a:srgbClr val="343434"/>
+            </a:solidFill>
+            <a:ln>
+              <a:noFill/>
+            </a:ln>
+          </p:spPr>
+          <p:style>
+            <a:lnRef idx="2">
+              <a:schemeClr val="accent1">
+                <a:shade val="50000"/>
+              </a:schemeClr>
+            </a:lnRef>
+            <a:fillRef idx="1">
+              <a:schemeClr val="accent1"/>
+            </a:fillRef>
+            <a:effectRef idx="0">
+              <a:schemeClr val="accent1"/>
+            </a:effectRef>
+            <a:fontRef idx="minor">
+              <a:schemeClr val="lt1"/>
+            </a:fontRef>
+          </p:style>
+          <p:txBody>
+            <a:bodyPr rtlCol="0" anchor="ctr"/>
+            <a:lstStyle/>
+            <a:p>
+              <a:pPr algn="ctr"/>
+              <a:endParaRPr lang="en-US"/>
+            </a:p>
+          </p:txBody>
+        </p:sp>
+        <p:sp>
+          <p:nvSpPr>
+            <p:cNvPr id="24" name="Rectangle 23"/>
+            <p:cNvSpPr/>
+            <p:nvPr/>
+          </p:nvSpPr>
+          <p:spPr>
+            <a:xfrm>
+              <a:off x="3903784" y="3644655"/>
+              <a:ext cx="114300" cy="104775"/>
+            </a:xfrm>
+            <a:prstGeom prst="rect">
+              <a:avLst/>
+            </a:prstGeom>
+            <a:solidFill>
+              <a:srgbClr val="343434"/>
+            </a:solidFill>
+            <a:ln>
+              <a:noFill/>
+            </a:ln>
+          </p:spPr>
+          <p:style>
+            <a:lnRef idx="2">
+              <a:schemeClr val="accent1">
+                <a:shade val="50000"/>
+              </a:schemeClr>
+            </a:lnRef>
+            <a:fillRef idx="1">
+              <a:schemeClr val="accent1"/>
+            </a:fillRef>
+            <a:effectRef idx="0">
+              <a:schemeClr val="accent1"/>
+            </a:effectRef>
+            <a:fontRef idx="minor">
+              <a:schemeClr val="lt1"/>
+            </a:fontRef>
+          </p:style>
+          <p:txBody>
+            <a:bodyPr rtlCol="0" anchor="ctr"/>
+            <a:lstStyle/>
+            <a:p>
+              <a:pPr algn="ctr"/>
+              <a:endParaRPr lang="en-US"/>
+            </a:p>
+          </p:txBody>
+        </p:sp>
+        <p:sp>
+          <p:nvSpPr>
+            <p:cNvPr id="25" name="Rectangle 24"/>
+            <p:cNvSpPr/>
+            <p:nvPr/>
+          </p:nvSpPr>
+          <p:spPr>
+            <a:xfrm>
+              <a:off x="5960787" y="3647036"/>
+              <a:ext cx="114300" cy="104775"/>
+            </a:xfrm>
+            <a:prstGeom prst="rect">
+              <a:avLst/>
+            </a:prstGeom>
+            <a:solidFill>
+              <a:srgbClr val="343434"/>
+            </a:solidFill>
+            <a:ln>
+              <a:noFill/>
+            </a:ln>
+          </p:spPr>
+          <p:style>
+            <a:lnRef idx="2">
+              <a:schemeClr val="accent1">
+                <a:shade val="50000"/>
+              </a:schemeClr>
+            </a:lnRef>
+            <a:fillRef idx="1">
+              <a:schemeClr val="accent1"/>
+            </a:fillRef>
+            <a:effectRef idx="0">
+              <a:schemeClr val="accent1"/>
+            </a:effectRef>
+            <a:fontRef idx="minor">
+              <a:schemeClr val="lt1"/>
+            </a:fontRef>
+          </p:style>
+          <p:txBody>
+            <a:bodyPr rtlCol="0" anchor="ctr"/>
+            <a:lstStyle/>
+            <a:p>
+              <a:pPr algn="ctr"/>
+              <a:endParaRPr lang="en-US"/>
+            </a:p>
+          </p:txBody>
+        </p:sp>
+        <p:sp>
+          <p:nvSpPr>
+            <p:cNvPr id="26" name="Rectangle 25"/>
+            <p:cNvSpPr/>
+            <p:nvPr/>
+          </p:nvSpPr>
+          <p:spPr>
+            <a:xfrm>
+              <a:off x="5959002" y="4102656"/>
+              <a:ext cx="114300" cy="104775"/>
+            </a:xfrm>
+            <a:prstGeom prst="rect">
+              <a:avLst/>
+            </a:prstGeom>
+            <a:solidFill>
+              <a:srgbClr val="343434"/>
+            </a:solidFill>
+            <a:ln>
+              <a:noFill/>
+            </a:ln>
+          </p:spPr>
+          <p:style>
+            <a:lnRef idx="2">
+              <a:schemeClr val="accent1">
+                <a:shade val="50000"/>
+              </a:schemeClr>
+            </a:lnRef>
+            <a:fillRef idx="1">
+              <a:schemeClr val="accent1"/>
+            </a:fillRef>
+            <a:effectRef idx="0">
+              <a:schemeClr val="accent1"/>
+            </a:effectRef>
+            <a:fontRef idx="minor">
+              <a:schemeClr val="lt1"/>
+            </a:fontRef>
+          </p:style>
+          <p:txBody>
+            <a:bodyPr rtlCol="0" anchor="ctr"/>
+            <a:lstStyle/>
+            <a:p>
+              <a:pPr algn="ctr"/>
+              <a:endParaRPr lang="en-US"/>
+            </a:p>
+          </p:txBody>
+        </p:sp>
+        <p:sp>
+          <p:nvSpPr>
+            <p:cNvPr id="27" name="Rectangle 26"/>
+            <p:cNvSpPr/>
+            <p:nvPr/>
+          </p:nvSpPr>
+          <p:spPr>
+            <a:xfrm>
+              <a:off x="3898941" y="4102656"/>
+              <a:ext cx="114300" cy="104775"/>
+            </a:xfrm>
+            <a:prstGeom prst="rect">
+              <a:avLst/>
+            </a:prstGeom>
+            <a:solidFill>
+              <a:srgbClr val="343434"/>
+            </a:solidFill>
+            <a:ln>
+              <a:noFill/>
+            </a:ln>
+          </p:spPr>
+          <p:style>
+            <a:lnRef idx="2">
+              <a:schemeClr val="accent1">
+                <a:shade val="50000"/>
+              </a:schemeClr>
+            </a:lnRef>
+            <a:fillRef idx="1">
+              <a:schemeClr val="accent1"/>
+            </a:fillRef>
+            <a:effectRef idx="0">
+              <a:schemeClr val="accent1"/>
+            </a:effectRef>
+            <a:fontRef idx="minor">
+              <a:schemeClr val="lt1"/>
+            </a:fontRef>
+          </p:style>
+          <p:txBody>
+            <a:bodyPr rtlCol="0" anchor="ctr"/>
+            <a:lstStyle/>
+            <a:p>
+              <a:pPr algn="ctr"/>
+              <a:endParaRPr lang="en-US"/>
+            </a:p>
+          </p:txBody>
+        </p:sp>
+        <p:sp>
+          <p:nvSpPr>
+            <p:cNvPr id="28" name="Rectangle 27"/>
+            <p:cNvSpPr/>
+            <p:nvPr/>
+          </p:nvSpPr>
+          <p:spPr>
+            <a:xfrm>
+              <a:off x="1854400" y="3647036"/>
+              <a:ext cx="114300" cy="104775"/>
+            </a:xfrm>
+            <a:prstGeom prst="rect">
+              <a:avLst/>
+            </a:prstGeom>
+            <a:solidFill>
+              <a:srgbClr val="343434"/>
+            </a:solidFill>
+            <a:ln>
+              <a:noFill/>
+            </a:ln>
+          </p:spPr>
+          <p:style>
+            <a:lnRef idx="2">
+              <a:schemeClr val="accent1">
+                <a:shade val="50000"/>
+              </a:schemeClr>
+            </a:lnRef>
+            <a:fillRef idx="1">
+              <a:schemeClr val="accent1"/>
+            </a:fillRef>
+            <a:effectRef idx="0">
+              <a:schemeClr val="accent1"/>
+            </a:effectRef>
+            <a:fontRef idx="minor">
+              <a:schemeClr val="lt1"/>
+            </a:fontRef>
+          </p:style>
+          <p:txBody>
+            <a:bodyPr rtlCol="0" anchor="ctr"/>
+            <a:lstStyle/>
+            <a:p>
+              <a:pPr algn="ctr"/>
+              <a:endParaRPr lang="en-US"/>
+            </a:p>
+          </p:txBody>
+        </p:sp>
+        <p:sp>
+          <p:nvSpPr>
+            <p:cNvPr id="29" name="Rectangle 28"/>
+            <p:cNvSpPr/>
+            <p:nvPr/>
+          </p:nvSpPr>
+          <p:spPr>
+            <a:xfrm>
+              <a:off x="1854400" y="4105037"/>
+              <a:ext cx="114300" cy="104775"/>
+            </a:xfrm>
+            <a:prstGeom prst="rect">
+              <a:avLst/>
+            </a:prstGeom>
+            <a:solidFill>
+              <a:srgbClr val="343434"/>
+            </a:solidFill>
+            <a:ln>
+              <a:noFill/>
+            </a:ln>
+          </p:spPr>
+          <p:style>
+            <a:lnRef idx="2">
+              <a:schemeClr val="accent1">
+                <a:shade val="50000"/>
+              </a:schemeClr>
+            </a:lnRef>
+            <a:fillRef idx="1">
+              <a:schemeClr val="accent1"/>
+            </a:fillRef>
+            <a:effectRef idx="0">
+              <a:schemeClr val="accent1"/>
+            </a:effectRef>
+            <a:fontRef idx="minor">
+              <a:schemeClr val="lt1"/>
+            </a:fontRef>
+          </p:style>
+          <p:txBody>
+            <a:bodyPr rtlCol="0" anchor="ctr"/>
+            <a:lstStyle/>
+            <a:p>
+              <a:pPr algn="ctr"/>
+              <a:endParaRPr lang="en-US"/>
+            </a:p>
+          </p:txBody>
+        </p:sp>
+        <p:sp>
+          <p:nvSpPr>
+            <p:cNvPr id="30" name="TextBox 29"/>
+            <p:cNvSpPr txBox="1"/>
+            <p:nvPr/>
+          </p:nvSpPr>
+          <p:spPr>
+            <a:xfrm>
+              <a:off x="1755703" y="2423051"/>
+              <a:ext cx="303288" cy="215444"/>
+            </a:xfrm>
+            <a:prstGeom prst="rect">
+              <a:avLst/>
+            </a:prstGeom>
+            <a:noFill/>
+          </p:spPr>
+          <p:txBody>
+            <a:bodyPr wrap="none" rtlCol="0">
+              <a:spAutoFit/>
+            </a:bodyPr>
+            <a:lstStyle/>
+            <a:p>
+              <a:r>
+                <a:rPr lang="en-US" sz="800" dirty="0">
+                  <a:solidFill>
+                    <a:schemeClr val="bg1">
+                      <a:lumMod val="95000"/>
+                    </a:schemeClr>
+                  </a:solidFill>
+                  <a:latin typeface="Times New Roman" panose="02020603050405020304" pitchFamily="18" charset="0"/>
+                  <a:cs typeface="Times New Roman" panose="02020603050405020304" pitchFamily="18" charset="0"/>
+                </a:rPr>
+                <a:t>(a)</a:t>
+              </a:r>
+              <a:endParaRPr lang="en-US" sz="1050" dirty="0">
+                <a:solidFill>
+                  <a:schemeClr val="bg1">
+                    <a:lumMod val="95000"/>
+                  </a:schemeClr>
+                </a:solidFill>
+                <a:latin typeface="Times New Roman" panose="02020603050405020304" pitchFamily="18" charset="0"/>
+                <a:cs typeface="Times New Roman" panose="02020603050405020304" pitchFamily="18" charset="0"/>
+              </a:endParaRPr>
+            </a:p>
+          </p:txBody>
+        </p:sp>
+        <p:sp>
+          <p:nvSpPr>
+            <p:cNvPr id="31" name="TextBox 30"/>
+            <p:cNvSpPr txBox="1"/>
+            <p:nvPr/>
+          </p:nvSpPr>
+          <p:spPr>
+            <a:xfrm>
+              <a:off x="3805322" y="2423051"/>
+              <a:ext cx="309700" cy="215444"/>
+            </a:xfrm>
+            <a:prstGeom prst="rect">
+              <a:avLst/>
+            </a:prstGeom>
+            <a:noFill/>
+          </p:spPr>
+          <p:txBody>
+            <a:bodyPr wrap="none" rtlCol="0">
+              <a:spAutoFit/>
+            </a:bodyPr>
+            <a:lstStyle/>
+            <a:p>
+              <a:r>
+                <a:rPr lang="en-US" sz="800">
+                  <a:solidFill>
+                    <a:schemeClr val="bg1">
+                      <a:lumMod val="95000"/>
+                    </a:schemeClr>
+                  </a:solidFill>
+                  <a:latin typeface="Times New Roman" panose="02020603050405020304" pitchFamily="18" charset="0"/>
+                  <a:cs typeface="Times New Roman" panose="02020603050405020304" pitchFamily="18" charset="0"/>
+                </a:rPr>
+                <a:t>(b)</a:t>
+              </a:r>
+              <a:endParaRPr lang="en-US" sz="1050" dirty="0">
+                <a:solidFill>
+                  <a:schemeClr val="bg1">
+                    <a:lumMod val="95000"/>
+                  </a:schemeClr>
+                </a:solidFill>
+                <a:latin typeface="Times New Roman" panose="02020603050405020304" pitchFamily="18" charset="0"/>
+                <a:cs typeface="Times New Roman" panose="02020603050405020304" pitchFamily="18" charset="0"/>
+              </a:endParaRPr>
+            </a:p>
+          </p:txBody>
+        </p:sp>
+        <p:sp>
+          <p:nvSpPr>
+            <p:cNvPr id="32" name="TextBox 31"/>
+            <p:cNvSpPr txBox="1"/>
+            <p:nvPr/>
+          </p:nvSpPr>
+          <p:spPr>
+            <a:xfrm>
+              <a:off x="5861605" y="2423051"/>
+              <a:ext cx="296876" cy="215444"/>
+            </a:xfrm>
+            <a:prstGeom prst="rect">
+              <a:avLst/>
+            </a:prstGeom>
+            <a:noFill/>
+          </p:spPr>
+          <p:txBody>
+            <a:bodyPr wrap="none" rtlCol="0">
+              <a:spAutoFit/>
+            </a:bodyPr>
+            <a:lstStyle/>
+            <a:p>
+              <a:r>
+                <a:rPr lang="en-US" sz="800">
+                  <a:solidFill>
+                    <a:schemeClr val="bg1">
+                      <a:lumMod val="95000"/>
+                    </a:schemeClr>
+                  </a:solidFill>
+                  <a:latin typeface="Times New Roman" panose="02020603050405020304" pitchFamily="18" charset="0"/>
+                  <a:cs typeface="Times New Roman" panose="02020603050405020304" pitchFamily="18" charset="0"/>
+                </a:rPr>
+                <a:t>(c)</a:t>
+              </a:r>
+              <a:endParaRPr lang="en-US" sz="1050" dirty="0">
+                <a:solidFill>
+                  <a:schemeClr val="bg1">
+                    <a:lumMod val="95000"/>
+                  </a:schemeClr>
+                </a:solidFill>
+                <a:latin typeface="Times New Roman" panose="02020603050405020304" pitchFamily="18" charset="0"/>
+                <a:cs typeface="Times New Roman" panose="02020603050405020304" pitchFamily="18" charset="0"/>
+              </a:endParaRPr>
+            </a:p>
+          </p:txBody>
+        </p:sp>
+        <p:sp>
+          <p:nvSpPr>
+            <p:cNvPr id="33" name="TextBox 32"/>
+            <p:cNvSpPr txBox="1"/>
+            <p:nvPr/>
+          </p:nvSpPr>
+          <p:spPr>
+            <a:xfrm>
+              <a:off x="1739272" y="4018990"/>
+              <a:ext cx="309700" cy="215444"/>
+            </a:xfrm>
+            <a:prstGeom prst="rect">
+              <a:avLst/>
+            </a:prstGeom>
+            <a:noFill/>
+          </p:spPr>
+          <p:txBody>
+            <a:bodyPr wrap="none" rtlCol="0">
+              <a:spAutoFit/>
+            </a:bodyPr>
+            <a:lstStyle/>
+            <a:p>
+              <a:r>
+                <a:rPr lang="en-US" sz="800">
+                  <a:solidFill>
+                    <a:schemeClr val="bg1">
+                      <a:lumMod val="95000"/>
+                    </a:schemeClr>
+                  </a:solidFill>
+                  <a:latin typeface="Times New Roman" panose="02020603050405020304" pitchFamily="18" charset="0"/>
+                  <a:cs typeface="Times New Roman" panose="02020603050405020304" pitchFamily="18" charset="0"/>
+                </a:rPr>
+                <a:t>(d)</a:t>
+              </a:r>
+              <a:endParaRPr lang="en-US" sz="1050" dirty="0">
+                <a:solidFill>
+                  <a:schemeClr val="bg1">
+                    <a:lumMod val="95000"/>
+                  </a:schemeClr>
+                </a:solidFill>
+                <a:latin typeface="Times New Roman" panose="02020603050405020304" pitchFamily="18" charset="0"/>
+                <a:cs typeface="Times New Roman" panose="02020603050405020304" pitchFamily="18" charset="0"/>
+              </a:endParaRPr>
+            </a:p>
+          </p:txBody>
+        </p:sp>
+        <p:sp>
+          <p:nvSpPr>
+            <p:cNvPr id="34" name="TextBox 33"/>
+            <p:cNvSpPr txBox="1"/>
+            <p:nvPr/>
+          </p:nvSpPr>
+          <p:spPr>
+            <a:xfrm>
+              <a:off x="3788891" y="4018990"/>
+              <a:ext cx="296876" cy="215444"/>
+            </a:xfrm>
+            <a:prstGeom prst="rect">
+              <a:avLst/>
+            </a:prstGeom>
+            <a:noFill/>
+          </p:spPr>
+          <p:txBody>
+            <a:bodyPr wrap="none" rtlCol="0">
+              <a:spAutoFit/>
+            </a:bodyPr>
+            <a:lstStyle/>
+            <a:p>
+              <a:r>
+                <a:rPr lang="en-US" sz="800">
+                  <a:solidFill>
+                    <a:schemeClr val="bg1">
+                      <a:lumMod val="95000"/>
+                    </a:schemeClr>
+                  </a:solidFill>
+                  <a:latin typeface="Times New Roman" panose="02020603050405020304" pitchFamily="18" charset="0"/>
+                  <a:cs typeface="Times New Roman" panose="02020603050405020304" pitchFamily="18" charset="0"/>
+                </a:rPr>
+                <a:t>(e)</a:t>
+              </a:r>
+              <a:endParaRPr lang="en-US" sz="1050" dirty="0">
+                <a:solidFill>
+                  <a:schemeClr val="bg1">
+                    <a:lumMod val="95000"/>
+                  </a:schemeClr>
+                </a:solidFill>
+                <a:latin typeface="Times New Roman" panose="02020603050405020304" pitchFamily="18" charset="0"/>
+                <a:cs typeface="Times New Roman" panose="02020603050405020304" pitchFamily="18" charset="0"/>
+              </a:endParaRPr>
+            </a:p>
+          </p:txBody>
+        </p:sp>
+        <p:sp>
+          <p:nvSpPr>
+            <p:cNvPr id="35" name="TextBox 34"/>
+            <p:cNvSpPr txBox="1"/>
+            <p:nvPr/>
+          </p:nvSpPr>
+          <p:spPr>
+            <a:xfrm>
+              <a:off x="5845174" y="4018990"/>
+              <a:ext cx="285656" cy="215444"/>
+            </a:xfrm>
+            <a:prstGeom prst="rect">
+              <a:avLst/>
+            </a:prstGeom>
+            <a:noFill/>
+          </p:spPr>
+          <p:txBody>
+            <a:bodyPr wrap="none" rtlCol="0">
+              <a:spAutoFit/>
+            </a:bodyPr>
+            <a:lstStyle/>
+            <a:p>
+              <a:r>
+                <a:rPr lang="en-US" sz="800">
+                  <a:solidFill>
+                    <a:schemeClr val="bg1">
+                      <a:lumMod val="95000"/>
+                    </a:schemeClr>
+                  </a:solidFill>
+                  <a:latin typeface="Times New Roman" panose="02020603050405020304" pitchFamily="18" charset="0"/>
+                  <a:cs typeface="Times New Roman" panose="02020603050405020304" pitchFamily="18" charset="0"/>
+                </a:rPr>
+                <a:t>(f)</a:t>
+              </a:r>
+              <a:endParaRPr lang="en-US" sz="1050" dirty="0">
+                <a:solidFill>
+                  <a:schemeClr val="bg1">
+                    <a:lumMod val="95000"/>
+                  </a:schemeClr>
+                </a:solidFill>
+                <a:latin typeface="Times New Roman" panose="02020603050405020304" pitchFamily="18" charset="0"/>
+                <a:cs typeface="Times New Roman" panose="02020603050405020304" pitchFamily="18" charset="0"/>
+              </a:endParaRPr>
+            </a:p>
+          </p:txBody>
+        </p:sp>
+        <mc:AlternateContent xmlns:mc="http://schemas.openxmlformats.org/markup-compatibility/2006">
+          <mc:Choice xmlns:a14="http://schemas.microsoft.com/office/drawing/2010/main" Requires="a14">
+            <p:sp>
+              <p:nvSpPr>
+                <p:cNvPr id="9" name="TextBox 8"/>
+                <p:cNvSpPr txBox="1"/>
+                <p:nvPr/>
+              </p:nvSpPr>
+              <p:spPr>
+                <a:xfrm>
+                  <a:off x="769124" y="1076722"/>
+                  <a:ext cx="641138" cy="209737"/>
+                </a:xfrm>
+                <a:prstGeom prst="rect">
+                  <a:avLst/>
+                </a:prstGeom>
+                <a:noFill/>
+              </p:spPr>
+              <p:txBody>
+                <a:bodyPr wrap="none" rtlCol="0">
+                  <a:spAutoFit/>
+                </a:bodyPr>
+                <a:lstStyle/>
+                <a:p>
+                  <a14:m>
+                    <m:oMathPara xmlns:m="http://schemas.openxmlformats.org/officeDocument/2006/math">
+                      <m:oMathParaPr>
+                        <m:jc m:val="centerGroup"/>
+                      </m:oMathParaPr>
+                      <m:oMath xmlns:m="http://schemas.openxmlformats.org/officeDocument/2006/math">
+                        <m:sSub>
+                          <m:sSubPr>
+                            <m:ctrlPr>
+                              <a:rPr lang="en-US" sz="700" b="1" i="1" smtClean="0">
+                                <a:solidFill>
+                                  <a:schemeClr val="accent2"/>
+                                </a:solidFill>
+                                <a:latin typeface="Cambria Math" panose="02040503050406030204" pitchFamily="18" charset="0"/>
+                              </a:rPr>
+                            </m:ctrlPr>
+                          </m:sSubPr>
+                          <m:e>
+                            <m:r>
+                              <a:rPr lang="en-US" sz="700" b="1" i="1" smtClean="0">
+                                <a:solidFill>
+                                  <a:schemeClr val="accent2"/>
+                                </a:solidFill>
+                                <a:latin typeface="Cambria Math" panose="02040503050406030204" pitchFamily="18" charset="0"/>
+                              </a:rPr>
+                              <m:t>𝒎</m:t>
+                            </m:r>
+                          </m:e>
+                          <m:sub>
+                            <m:r>
+                              <a:rPr lang="en-US" sz="700" b="1" i="1" smtClean="0">
+                                <a:solidFill>
+                                  <a:schemeClr val="accent2"/>
+                                </a:solidFill>
+                                <a:latin typeface="Cambria Math" panose="02040503050406030204" pitchFamily="18" charset="0"/>
+                              </a:rPr>
+                              <m:t>𝒑</m:t>
+                            </m:r>
+                          </m:sub>
+                        </m:sSub>
+                        <m:r>
+                          <a:rPr lang="en-US" sz="700" b="1" i="1" smtClean="0">
+                            <a:solidFill>
+                              <a:schemeClr val="accent2"/>
+                            </a:solidFill>
+                            <a:latin typeface="Cambria Math" panose="02040503050406030204" pitchFamily="18" charset="0"/>
+                          </a:rPr>
+                          <m:t>=</m:t>
+                        </m:r>
+                        <m:r>
+                          <a:rPr lang="en-US" sz="700" b="1" i="1" smtClean="0">
+                            <a:solidFill>
+                              <a:schemeClr val="accent2"/>
+                            </a:solidFill>
+                            <a:latin typeface="Cambria Math" panose="02040503050406030204" pitchFamily="18" charset="0"/>
+                          </a:rPr>
+                          <m:t>𝟎</m:t>
+                        </m:r>
+                        <m:r>
+                          <a:rPr lang="en-US" sz="700" b="1" i="1" smtClean="0">
+                            <a:solidFill>
+                              <a:schemeClr val="accent2"/>
+                            </a:solidFill>
+                            <a:latin typeface="Cambria Math" panose="02040503050406030204" pitchFamily="18" charset="0"/>
+                          </a:rPr>
+                          <m:t>.</m:t>
+                        </m:r>
+                        <m:r>
+                          <a:rPr lang="en-US" sz="700" b="1" i="1" smtClean="0">
+                            <a:solidFill>
+                              <a:schemeClr val="accent2"/>
+                            </a:solidFill>
+                            <a:latin typeface="Cambria Math" panose="02040503050406030204" pitchFamily="18" charset="0"/>
+                          </a:rPr>
+                          <m:t>𝟓𝟓</m:t>
+                        </m:r>
+                      </m:oMath>
+                    </m:oMathPara>
+                  </a14:m>
+                  <a:endParaRPr lang="en-US" sz="700" b="1">
+                    <a:solidFill>
+                      <a:schemeClr val="accent2"/>
+                    </a:solidFill>
+                  </a:endParaRPr>
+                </a:p>
+              </p:txBody>
+            </p:sp>
+          </mc:Choice>
+          <mc:Fallback>
+            <p:sp>
+              <p:nvSpPr>
+                <p:cNvPr id="9" name="TextBox 8"/>
+                <p:cNvSpPr txBox="1">
+                  <a:spLocks noRot="1" noChangeAspect="1" noMove="1" noResize="1" noEditPoints="1" noAdjustHandles="1" noChangeArrowheads="1" noChangeShapeType="1" noTextEdit="1"/>
+                </p:cNvSpPr>
+                <p:nvPr/>
+              </p:nvSpPr>
+              <p:spPr>
+                <a:xfrm>
+                  <a:off x="769124" y="1076722"/>
+                  <a:ext cx="641138" cy="209737"/>
+                </a:xfrm>
+                <a:prstGeom prst="rect">
+                  <a:avLst/>
+                </a:prstGeom>
+                <a:blipFill>
+                  <a:blip r:embed="rId8"/>
+                  <a:stretch>
+                    <a:fillRect/>
+                  </a:stretch>
+                </a:blipFill>
+              </p:spPr>
+              <p:txBody>
+                <a:bodyPr/>
+                <a:lstStyle/>
+                <a:p>
+                  <a:r>
+                    <a:rPr lang="en-US">
+                      <a:noFill/>
+                    </a:rPr>
+                    <a:t> </a:t>
+                  </a:r>
+                </a:p>
+              </p:txBody>
+            </p:sp>
+          </mc:Fallback>
+        </mc:AlternateContent>
+        <mc:AlternateContent xmlns:mc="http://schemas.openxmlformats.org/markup-compatibility/2006">
+          <mc:Choice xmlns:a14="http://schemas.microsoft.com/office/drawing/2010/main" Requires="a14">
+            <p:sp>
+              <p:nvSpPr>
+                <p:cNvPr id="36" name="TextBox 35"/>
+                <p:cNvSpPr txBox="1"/>
+                <p:nvPr/>
+              </p:nvSpPr>
+              <p:spPr>
+                <a:xfrm>
+                  <a:off x="2905977" y="1076722"/>
+                  <a:ext cx="588238" cy="209737"/>
+                </a:xfrm>
+                <a:prstGeom prst="rect">
+                  <a:avLst/>
+                </a:prstGeom>
+                <a:noFill/>
+              </p:spPr>
+              <p:txBody>
+                <a:bodyPr wrap="none" rtlCol="0">
+                  <a:spAutoFit/>
+                </a:bodyPr>
+                <a:lstStyle/>
+                <a:p>
+                  <a14:m>
+                    <m:oMathPara xmlns:m="http://schemas.openxmlformats.org/officeDocument/2006/math">
+                      <m:oMathParaPr>
+                        <m:jc m:val="centerGroup"/>
+                      </m:oMathParaPr>
+                      <m:oMath xmlns:m="http://schemas.openxmlformats.org/officeDocument/2006/math">
+                        <m:sSub>
+                          <m:sSubPr>
+                            <m:ctrlPr>
+                              <a:rPr lang="en-US" sz="700" b="1" i="1" smtClean="0">
+                                <a:solidFill>
+                                  <a:schemeClr val="accent2"/>
+                                </a:solidFill>
+                                <a:latin typeface="Cambria Math" panose="02040503050406030204" pitchFamily="18" charset="0"/>
+                              </a:rPr>
+                            </m:ctrlPr>
+                          </m:sSubPr>
+                          <m:e>
+                            <m:r>
+                              <a:rPr lang="en-US" sz="700" b="1" i="1" smtClean="0">
+                                <a:solidFill>
+                                  <a:schemeClr val="accent2"/>
+                                </a:solidFill>
+                                <a:latin typeface="Cambria Math" panose="02040503050406030204" pitchFamily="18" charset="0"/>
+                              </a:rPr>
+                              <m:t>𝒎</m:t>
+                            </m:r>
+                          </m:e>
+                          <m:sub>
+                            <m:r>
+                              <a:rPr lang="en-US" sz="700" b="1" i="1" smtClean="0">
+                                <a:solidFill>
+                                  <a:schemeClr val="accent2"/>
+                                </a:solidFill>
+                                <a:latin typeface="Cambria Math" panose="02040503050406030204" pitchFamily="18" charset="0"/>
+                              </a:rPr>
+                              <m:t>𝒑</m:t>
+                            </m:r>
+                          </m:sub>
+                        </m:sSub>
+                        <m:r>
+                          <a:rPr lang="en-US" sz="700" b="1" i="1" smtClean="0">
+                            <a:solidFill>
+                              <a:schemeClr val="accent2"/>
+                            </a:solidFill>
+                            <a:latin typeface="Cambria Math" panose="02040503050406030204" pitchFamily="18" charset="0"/>
+                          </a:rPr>
+                          <m:t>=</m:t>
+                        </m:r>
+                        <m:r>
+                          <a:rPr lang="en-US" sz="700" b="1" i="1" smtClean="0">
+                            <a:solidFill>
+                              <a:schemeClr val="accent2"/>
+                            </a:solidFill>
+                            <a:latin typeface="Cambria Math" panose="02040503050406030204" pitchFamily="18" charset="0"/>
+                          </a:rPr>
+                          <m:t>𝟏</m:t>
+                        </m:r>
+                        <m:r>
+                          <a:rPr lang="en-US" sz="700" b="1" i="1" smtClean="0">
+                            <a:solidFill>
+                              <a:schemeClr val="accent2"/>
+                            </a:solidFill>
+                            <a:latin typeface="Cambria Math" panose="02040503050406030204" pitchFamily="18" charset="0"/>
+                          </a:rPr>
+                          <m:t>.</m:t>
+                        </m:r>
+                        <m:r>
+                          <a:rPr lang="en-US" sz="700" b="1" i="1" smtClean="0">
+                            <a:solidFill>
+                              <a:schemeClr val="accent2"/>
+                            </a:solidFill>
+                            <a:latin typeface="Cambria Math" panose="02040503050406030204" pitchFamily="18" charset="0"/>
+                          </a:rPr>
+                          <m:t>𝟎</m:t>
+                        </m:r>
+                      </m:oMath>
+                    </m:oMathPara>
+                  </a14:m>
+                  <a:endParaRPr lang="en-US" sz="700" b="1">
+                    <a:solidFill>
+                      <a:schemeClr val="accent2"/>
+                    </a:solidFill>
+                  </a:endParaRPr>
+                </a:p>
+              </p:txBody>
+            </p:sp>
+          </mc:Choice>
+          <mc:Fallback>
+            <p:sp>
+              <p:nvSpPr>
+                <p:cNvPr id="36" name="TextBox 35"/>
+                <p:cNvSpPr txBox="1">
+                  <a:spLocks noRot="1" noChangeAspect="1" noMove="1" noResize="1" noEditPoints="1" noAdjustHandles="1" noChangeArrowheads="1" noChangeShapeType="1" noTextEdit="1"/>
+                </p:cNvSpPr>
+                <p:nvPr/>
+              </p:nvSpPr>
+              <p:spPr>
+                <a:xfrm>
+                  <a:off x="2905977" y="1076722"/>
+                  <a:ext cx="588238" cy="209737"/>
+                </a:xfrm>
+                <a:prstGeom prst="rect">
+                  <a:avLst/>
+                </a:prstGeom>
+                <a:blipFill>
+                  <a:blip r:embed="rId9"/>
+                  <a:stretch>
+                    <a:fillRect/>
+                  </a:stretch>
+                </a:blipFill>
+              </p:spPr>
+              <p:txBody>
+                <a:bodyPr/>
+                <a:lstStyle/>
+                <a:p>
+                  <a:r>
+                    <a:rPr lang="en-US">
+                      <a:noFill/>
+                    </a:rPr>
+                    <a:t> </a:t>
+                  </a:r>
+                </a:p>
+              </p:txBody>
+            </p:sp>
+          </mc:Fallback>
+        </mc:AlternateContent>
+        <mc:AlternateContent xmlns:mc="http://schemas.openxmlformats.org/markup-compatibility/2006">
+          <mc:Choice xmlns:a14="http://schemas.microsoft.com/office/drawing/2010/main" Requires="a14">
+            <p:sp>
+              <p:nvSpPr>
+                <p:cNvPr id="37" name="TextBox 36"/>
+                <p:cNvSpPr txBox="1"/>
+                <p:nvPr/>
+              </p:nvSpPr>
+              <p:spPr>
+                <a:xfrm>
+                  <a:off x="5013483" y="1076722"/>
+                  <a:ext cx="588238" cy="209737"/>
+                </a:xfrm>
+                <a:prstGeom prst="rect">
+                  <a:avLst/>
+                </a:prstGeom>
+                <a:noFill/>
+              </p:spPr>
+              <p:txBody>
+                <a:bodyPr wrap="none" rtlCol="0">
+                  <a:spAutoFit/>
+                </a:bodyPr>
+                <a:lstStyle/>
+                <a:p>
+                  <a14:m>
+                    <m:oMathPara xmlns:m="http://schemas.openxmlformats.org/officeDocument/2006/math">
+                      <m:oMathParaPr>
+                        <m:jc m:val="centerGroup"/>
+                      </m:oMathParaPr>
+                      <m:oMath xmlns:m="http://schemas.openxmlformats.org/officeDocument/2006/math">
+                        <m:sSub>
+                          <m:sSubPr>
+                            <m:ctrlPr>
+                              <a:rPr lang="en-US" sz="700" b="1" i="1" smtClean="0">
+                                <a:solidFill>
+                                  <a:schemeClr val="accent2"/>
+                                </a:solidFill>
+                                <a:latin typeface="Cambria Math" panose="02040503050406030204" pitchFamily="18" charset="0"/>
+                              </a:rPr>
+                            </m:ctrlPr>
+                          </m:sSubPr>
+                          <m:e>
+                            <m:r>
+                              <a:rPr lang="en-US" sz="700" b="1" i="1" smtClean="0">
+                                <a:solidFill>
+                                  <a:schemeClr val="accent2"/>
+                                </a:solidFill>
+                                <a:latin typeface="Cambria Math" panose="02040503050406030204" pitchFamily="18" charset="0"/>
+                              </a:rPr>
+                              <m:t>𝒎</m:t>
+                            </m:r>
+                          </m:e>
+                          <m:sub>
+                            <m:r>
+                              <a:rPr lang="en-US" sz="700" b="1" i="1" smtClean="0">
+                                <a:solidFill>
+                                  <a:schemeClr val="accent2"/>
+                                </a:solidFill>
+                                <a:latin typeface="Cambria Math" panose="02040503050406030204" pitchFamily="18" charset="0"/>
+                              </a:rPr>
+                              <m:t>𝒑</m:t>
+                            </m:r>
+                          </m:sub>
+                        </m:sSub>
+                        <m:r>
+                          <a:rPr lang="en-US" sz="700" b="1" i="1" smtClean="0">
+                            <a:solidFill>
+                              <a:schemeClr val="accent2"/>
+                            </a:solidFill>
+                            <a:latin typeface="Cambria Math" panose="02040503050406030204" pitchFamily="18" charset="0"/>
+                          </a:rPr>
+                          <m:t>=</m:t>
+                        </m:r>
+                        <m:r>
+                          <a:rPr lang="en-US" sz="700" b="1" i="1" smtClean="0">
+                            <a:solidFill>
+                              <a:schemeClr val="accent2"/>
+                            </a:solidFill>
+                            <a:latin typeface="Cambria Math" panose="02040503050406030204" pitchFamily="18" charset="0"/>
+                          </a:rPr>
+                          <m:t>𝟐</m:t>
+                        </m:r>
+                        <m:r>
+                          <a:rPr lang="en-US" sz="700" b="1" i="1" smtClean="0">
+                            <a:solidFill>
+                              <a:schemeClr val="accent2"/>
+                            </a:solidFill>
+                            <a:latin typeface="Cambria Math" panose="02040503050406030204" pitchFamily="18" charset="0"/>
+                          </a:rPr>
+                          <m:t>.</m:t>
+                        </m:r>
+                        <m:r>
+                          <a:rPr lang="en-US" sz="700" b="1" i="1" smtClean="0">
+                            <a:solidFill>
+                              <a:schemeClr val="accent2"/>
+                            </a:solidFill>
+                            <a:latin typeface="Cambria Math" panose="02040503050406030204" pitchFamily="18" charset="0"/>
+                          </a:rPr>
+                          <m:t>𝟎</m:t>
+                        </m:r>
+                      </m:oMath>
+                    </m:oMathPara>
+                  </a14:m>
+                  <a:endParaRPr lang="en-US" sz="700" b="1">
+                    <a:solidFill>
+                      <a:schemeClr val="accent2"/>
+                    </a:solidFill>
+                  </a:endParaRPr>
+                </a:p>
+              </p:txBody>
+            </p:sp>
+          </mc:Choice>
+          <mc:Fallback>
+            <p:sp>
+              <p:nvSpPr>
+                <p:cNvPr id="37" name="TextBox 36"/>
+                <p:cNvSpPr txBox="1">
+                  <a:spLocks noRot="1" noChangeAspect="1" noMove="1" noResize="1" noEditPoints="1" noAdjustHandles="1" noChangeArrowheads="1" noChangeShapeType="1" noTextEdit="1"/>
+                </p:cNvSpPr>
+                <p:nvPr/>
+              </p:nvSpPr>
+              <p:spPr>
+                <a:xfrm>
+                  <a:off x="5013483" y="1076722"/>
+                  <a:ext cx="588238" cy="209737"/>
+                </a:xfrm>
+                <a:prstGeom prst="rect">
+                  <a:avLst/>
+                </a:prstGeom>
+                <a:blipFill>
+                  <a:blip r:embed="rId10"/>
+                  <a:stretch>
+                    <a:fillRect/>
+                  </a:stretch>
+                </a:blipFill>
+              </p:spPr>
+              <p:txBody>
+                <a:bodyPr/>
+                <a:lstStyle/>
+                <a:p>
+                  <a:r>
+                    <a:rPr lang="en-US">
+                      <a:noFill/>
+                    </a:rPr>
+                    <a:t> </a:t>
+                  </a:r>
+                </a:p>
+              </p:txBody>
+            </p:sp>
+          </mc:Fallback>
+        </mc:AlternateContent>
+        <mc:AlternateContent xmlns:mc="http://schemas.openxmlformats.org/markup-compatibility/2006">
+          <mc:Choice xmlns:a14="http://schemas.microsoft.com/office/drawing/2010/main" Requires="a14">
+            <p:sp>
+              <p:nvSpPr>
+                <p:cNvPr id="38" name="TextBox 37"/>
+                <p:cNvSpPr txBox="1"/>
+                <p:nvPr/>
+              </p:nvSpPr>
+              <p:spPr>
+                <a:xfrm rot="16200000">
+                  <a:off x="-307843" y="3439459"/>
+                  <a:ext cx="472309" cy="200055"/>
+                </a:xfrm>
+                <a:prstGeom prst="rect">
+                  <a:avLst/>
+                </a:prstGeom>
+                <a:noFill/>
+              </p:spPr>
+              <p:txBody>
+                <a:bodyPr wrap="none" rtlCol="0">
+                  <a:spAutoFit/>
+                </a:bodyPr>
+                <a:lstStyle/>
+                <a:p>
+                  <a14:m>
+                    <m:oMathPara xmlns:m="http://schemas.openxmlformats.org/officeDocument/2006/math">
+                      <m:oMathParaPr>
+                        <m:jc m:val="centerGroup"/>
+                      </m:oMathParaPr>
+                      <m:oMath xmlns:m="http://schemas.openxmlformats.org/officeDocument/2006/math">
+                        <m:sSub>
+                          <m:sSubPr>
+                            <m:ctrlPr>
+                              <a:rPr lang="en-US" sz="700" b="1" i="1" smtClean="0">
+                                <a:solidFill>
+                                  <a:schemeClr val="accent1">
+                                    <a:lumMod val="75000"/>
+                                  </a:schemeClr>
+                                </a:solidFill>
+                                <a:latin typeface="Cambria Math" panose="02040503050406030204" pitchFamily="18" charset="0"/>
+                              </a:rPr>
+                            </m:ctrlPr>
+                          </m:sSubPr>
+                          <m:e>
+                            <m:r>
+                              <a:rPr lang="en-US" sz="700" b="1" i="1" smtClean="0">
+                                <a:solidFill>
+                                  <a:schemeClr val="accent1">
+                                    <a:lumMod val="75000"/>
+                                  </a:schemeClr>
+                                </a:solidFill>
+                                <a:latin typeface="Cambria Math" panose="02040503050406030204" pitchFamily="18" charset="0"/>
+                              </a:rPr>
+                              <m:t>𝒅</m:t>
+                            </m:r>
+                          </m:e>
+                          <m:sub>
+                            <m:r>
+                              <a:rPr lang="en-US" sz="700" b="1" i="1" smtClean="0">
+                                <a:solidFill>
+                                  <a:schemeClr val="accent1">
+                                    <a:lumMod val="75000"/>
+                                  </a:schemeClr>
+                                </a:solidFill>
+                                <a:latin typeface="Cambria Math" panose="02040503050406030204" pitchFamily="18" charset="0"/>
+                              </a:rPr>
+                              <m:t>𝒆</m:t>
+                            </m:r>
+                          </m:sub>
+                        </m:sSub>
+                        <m:r>
+                          <a:rPr lang="en-US" sz="700" b="1" i="1" smtClean="0">
+                            <a:solidFill>
+                              <a:schemeClr val="accent1">
+                                <a:lumMod val="75000"/>
+                              </a:schemeClr>
+                            </a:solidFill>
+                            <a:latin typeface="Cambria Math" panose="02040503050406030204" pitchFamily="18" charset="0"/>
+                          </a:rPr>
+                          <m:t>=</m:t>
+                        </m:r>
+                        <m:r>
+                          <a:rPr lang="en-US" sz="700" b="1" i="1" smtClean="0">
+                            <a:solidFill>
+                              <a:schemeClr val="accent1">
+                                <a:lumMod val="75000"/>
+                              </a:schemeClr>
+                            </a:solidFill>
+                            <a:latin typeface="Cambria Math" panose="02040503050406030204" pitchFamily="18" charset="0"/>
+                          </a:rPr>
+                          <m:t>𝟎</m:t>
+                        </m:r>
+                      </m:oMath>
+                    </m:oMathPara>
+                  </a14:m>
+                  <a:endParaRPr lang="en-US" sz="700" b="1">
+                    <a:solidFill>
+                      <a:schemeClr val="accent1">
+                        <a:lumMod val="75000"/>
+                      </a:schemeClr>
+                    </a:solidFill>
+                  </a:endParaRPr>
+                </a:p>
+              </p:txBody>
+            </p:sp>
+          </mc:Choice>
+          <mc:Fallback>
+            <p:sp>
+              <p:nvSpPr>
+                <p:cNvPr id="38" name="TextBox 37"/>
+                <p:cNvSpPr txBox="1">
+                  <a:spLocks noRot="1" noChangeAspect="1" noMove="1" noResize="1" noEditPoints="1" noAdjustHandles="1" noChangeArrowheads="1" noChangeShapeType="1" noTextEdit="1"/>
+                </p:cNvSpPr>
+                <p:nvPr/>
+              </p:nvSpPr>
+              <p:spPr>
+                <a:xfrm rot="16200000">
+                  <a:off x="-307843" y="3439459"/>
+                  <a:ext cx="472309" cy="200055"/>
+                </a:xfrm>
+                <a:prstGeom prst="rect">
+                  <a:avLst/>
+                </a:prstGeom>
+                <a:blipFill>
+                  <a:blip r:embed="rId11"/>
+                  <a:stretch>
+                    <a:fillRect/>
+                  </a:stretch>
+                </a:blipFill>
+              </p:spPr>
+              <p:txBody>
+                <a:bodyPr/>
+                <a:lstStyle/>
+                <a:p>
+                  <a:r>
+                    <a:rPr lang="en-US">
+                      <a:noFill/>
+                    </a:rPr>
+                    <a:t> </a:t>
+                  </a:r>
+                </a:p>
+              </p:txBody>
+            </p:sp>
+          </mc:Fallback>
+        </mc:AlternateContent>
+        <mc:AlternateContent xmlns:mc="http://schemas.openxmlformats.org/markup-compatibility/2006">
+          <mc:Choice xmlns:a14="http://schemas.microsoft.com/office/drawing/2010/main" Requires="a14">
+            <p:sp>
+              <p:nvSpPr>
+                <p:cNvPr id="39" name="TextBox 38"/>
+                <p:cNvSpPr txBox="1"/>
+                <p:nvPr/>
+              </p:nvSpPr>
+              <p:spPr>
+                <a:xfrm rot="16200000">
+                  <a:off x="-443926" y="1882036"/>
+                  <a:ext cx="725583" cy="200055"/>
+                </a:xfrm>
+                <a:prstGeom prst="rect">
+                  <a:avLst/>
+                </a:prstGeom>
+                <a:noFill/>
+              </p:spPr>
+              <p:txBody>
+                <a:bodyPr wrap="none" rtlCol="0">
+                  <a:spAutoFit/>
+                </a:bodyPr>
+                <a:lstStyle/>
+                <a:p>
+                  <a14:m>
+                    <m:oMathPara xmlns:m="http://schemas.openxmlformats.org/officeDocument/2006/math">
+                      <m:oMathParaPr>
+                        <m:jc m:val="centerGroup"/>
+                      </m:oMathParaPr>
+                      <m:oMath xmlns:m="http://schemas.openxmlformats.org/officeDocument/2006/math">
+                        <m:sSub>
+                          <m:sSubPr>
+                            <m:ctrlPr>
+                              <a:rPr lang="en-US" sz="700" b="1" i="1" smtClean="0">
+                                <a:solidFill>
+                                  <a:schemeClr val="accent1">
+                                    <a:lumMod val="75000"/>
+                                  </a:schemeClr>
+                                </a:solidFill>
+                                <a:latin typeface="Cambria Math" panose="02040503050406030204" pitchFamily="18" charset="0"/>
+                              </a:rPr>
+                            </m:ctrlPr>
+                          </m:sSubPr>
+                          <m:e>
+                            <m:r>
+                              <a:rPr lang="en-US" sz="700" b="1" i="1" smtClean="0">
+                                <a:solidFill>
+                                  <a:schemeClr val="accent1">
+                                    <a:lumMod val="75000"/>
+                                  </a:schemeClr>
+                                </a:solidFill>
+                                <a:latin typeface="Cambria Math" panose="02040503050406030204" pitchFamily="18" charset="0"/>
+                              </a:rPr>
+                              <m:t>𝒅</m:t>
+                            </m:r>
+                          </m:e>
+                          <m:sub>
+                            <m:r>
+                              <a:rPr lang="en-US" sz="700" b="1" i="1" smtClean="0">
+                                <a:solidFill>
+                                  <a:schemeClr val="accent1">
+                                    <a:lumMod val="75000"/>
+                                  </a:schemeClr>
+                                </a:solidFill>
+                                <a:latin typeface="Cambria Math" panose="02040503050406030204" pitchFamily="18" charset="0"/>
+                              </a:rPr>
+                              <m:t>𝒆</m:t>
+                            </m:r>
+                          </m:sub>
+                        </m:sSub>
+                        <m:r>
+                          <a:rPr lang="en-US" sz="700" b="1" i="1" smtClean="0">
+                            <a:solidFill>
+                              <a:schemeClr val="accent1">
+                                <a:lumMod val="75000"/>
+                              </a:schemeClr>
+                            </a:solidFill>
+                            <a:latin typeface="Cambria Math" panose="02040503050406030204" pitchFamily="18" charset="0"/>
+                          </a:rPr>
+                          <m:t>=−</m:t>
+                        </m:r>
+                        <m:r>
+                          <a:rPr lang="en-US" sz="700" b="1" i="1" smtClean="0">
+                            <a:solidFill>
+                              <a:schemeClr val="accent1">
+                                <a:lumMod val="75000"/>
+                              </a:schemeClr>
+                            </a:solidFill>
+                            <a:latin typeface="Cambria Math" panose="02040503050406030204" pitchFamily="18" charset="0"/>
+                          </a:rPr>
+                          <m:t>𝟓</m:t>
+                        </m:r>
+                        <m:r>
+                          <a:rPr lang="en-US" sz="700" b="1" i="1" smtClean="0">
+                            <a:solidFill>
+                              <a:schemeClr val="accent1">
+                                <a:lumMod val="75000"/>
+                              </a:schemeClr>
+                            </a:solidFill>
+                            <a:latin typeface="Cambria Math" panose="02040503050406030204" pitchFamily="18" charset="0"/>
+                          </a:rPr>
+                          <m:t> </m:t>
+                        </m:r>
+                        <m:r>
+                          <a:rPr lang="en-US" sz="700" b="1" i="1" smtClean="0">
+                            <a:solidFill>
+                              <a:schemeClr val="accent1">
+                                <a:lumMod val="75000"/>
+                              </a:schemeClr>
+                            </a:solidFill>
+                            <a:latin typeface="Cambria Math" panose="02040503050406030204" pitchFamily="18" charset="0"/>
+                          </a:rPr>
+                          <m:t>𝒎𝒎</m:t>
+                        </m:r>
+                      </m:oMath>
+                    </m:oMathPara>
+                  </a14:m>
+                  <a:endParaRPr lang="en-US" sz="700" b="1">
+                    <a:solidFill>
+                      <a:schemeClr val="accent1">
+                        <a:lumMod val="75000"/>
+                      </a:schemeClr>
+                    </a:solidFill>
+                  </a:endParaRPr>
+                </a:p>
+              </p:txBody>
+            </p:sp>
+          </mc:Choice>
+          <mc:Fallback>
+            <p:sp>
+              <p:nvSpPr>
+                <p:cNvPr id="39" name="TextBox 38"/>
+                <p:cNvSpPr txBox="1">
+                  <a:spLocks noRot="1" noChangeAspect="1" noMove="1" noResize="1" noEditPoints="1" noAdjustHandles="1" noChangeArrowheads="1" noChangeShapeType="1" noTextEdit="1"/>
+                </p:cNvSpPr>
+                <p:nvPr/>
+              </p:nvSpPr>
+              <p:spPr>
+                <a:xfrm rot="16200000">
+                  <a:off x="-443926" y="1882036"/>
+                  <a:ext cx="725583" cy="200055"/>
+                </a:xfrm>
+                <a:prstGeom prst="rect">
+                  <a:avLst/>
+                </a:prstGeom>
+                <a:blipFill>
+                  <a:blip r:embed="rId12"/>
+                  <a:stretch>
+                    <a:fillRect/>
+                  </a:stretch>
+                </a:blipFill>
+              </p:spPr>
+              <p:txBody>
+                <a:bodyPr/>
+                <a:lstStyle/>
+                <a:p>
+                  <a:r>
+                    <a:rPr lang="en-US">
+                      <a:noFill/>
+                    </a:rPr>
+                    <a:t> </a:t>
+                  </a:r>
+                </a:p>
+              </p:txBody>
+            </p:sp>
+          </mc:Fallback>
+        </mc:AlternateContent>
+      </p:grpSp>
+    </p:spTree>
+    <p:extLst>
+      <p:ext uri="{BB962C8B-B14F-4D97-AF65-F5344CB8AC3E}">
+        <p14:creationId xmlns:p14="http://schemas.microsoft.com/office/powerpoint/2010/main" val="3861042743"/>
+      </p:ext>
+    </p:extLst>
+  </p:cSld>
+  <p:clrMapOvr>
+    <a:masterClrMapping/>
+  </p:clrMapOvr>
+</p:sld>
+</file>
+
+<file path=ppt/slides/slide3.xml><?xml version="1.0" encoding="utf-8"?>
+<p:sld xmlns:a="http://schemas.openxmlformats.org/drawingml/2006/main" xmlns:r="http://schemas.openxmlformats.org/officeDocument/2006/relationships" xmlns:p="http://schemas.openxmlformats.org/presentationml/2006/main">
+  <p:cSld>
+    <p:spTree>
+      <p:nvGrpSpPr>
+        <p:cNvPr id="1" name=""/>
+        <p:cNvGrpSpPr/>
+        <p:nvPr/>
+      </p:nvGrpSpPr>
+      <p:grpSpPr>
+        <a:xfrm>
+          <a:off x="0" y="0"/>
+          <a:ext cx="0" cy="0"/>
+          <a:chOff x="0" y="0"/>
+          <a:chExt cx="0" cy="0"/>
+        </a:xfrm>
+      </p:grpSpPr>
+      <p:grpSp>
+        <p:nvGrpSpPr>
           <p:cNvPr id="2" name="Group 1"/>
           <p:cNvGrpSpPr/>
           <p:nvPr/>
@@ -19997,7 +22096,7 @@
 </p:sld>
 </file>
 
-<file path=ppt/slides/slide3.xml><?xml version="1.0" encoding="utf-8"?>
+<file path=ppt/slides/slide4.xml><?xml version="1.0" encoding="utf-8"?>
 <p:sld xmlns:a="http://schemas.openxmlformats.org/drawingml/2006/main" xmlns:r="http://schemas.openxmlformats.org/officeDocument/2006/relationships" xmlns:p="http://schemas.openxmlformats.org/presentationml/2006/main">
   <p:cSld>
     <p:spTree>
@@ -20509,8 +22608,8 @@
               </a:prstGeom>
             </p:spPr>
           </p:pic>
-          <mc:AlternateContent xmlns:mc="http://schemas.openxmlformats.org/markup-compatibility/2006">
-            <mc:Choice xmlns:a14="http://schemas.microsoft.com/office/drawing/2010/main" Requires="a14">
+          <mc:AlternateContent xmlns:mc="http://schemas.openxmlformats.org/markup-compatibility/2006" xmlns:a14="http://schemas.microsoft.com/office/drawing/2010/main">
+            <mc:Choice Requires="a14">
               <p:sp>
                 <p:nvSpPr>
                   <p:cNvPr id="68" name="Rectangle 67"/>
@@ -20630,7 +22729,7 @@
                 </p:txBody>
               </p:sp>
             </mc:Choice>
-            <mc:Fallback>
+            <mc:Fallback xmlns="">
               <p:sp>
                 <p:nvSpPr>
                   <p:cNvPr id="68" name="Rectangle 67"/>
@@ -22452,8 +24551,8 @@
               </a:p>
             </p:txBody>
           </p:sp>
-          <mc:AlternateContent xmlns:mc="http://schemas.openxmlformats.org/markup-compatibility/2006">
-            <mc:Choice xmlns:a14="http://schemas.microsoft.com/office/drawing/2010/main" Requires="a14">
+          <mc:AlternateContent xmlns:mc="http://schemas.openxmlformats.org/markup-compatibility/2006" xmlns:a14="http://schemas.microsoft.com/office/drawing/2010/main">
+            <mc:Choice Requires="a14">
               <p:sp>
                 <p:nvSpPr>
                   <p:cNvPr id="18" name="TextBox 17"/>
@@ -22685,7 +24784,7 @@
                 </p:txBody>
               </p:sp>
             </mc:Choice>
-            <mc:Fallback>
+            <mc:Fallback xmlns="">
               <p:sp>
                 <p:nvSpPr>
                   <p:cNvPr id="18" name="TextBox 17"/>
@@ -24274,8 +26373,8 @@
               </p:txBody>
             </p:sp>
           </p:grpSp>
-          <mc:AlternateContent xmlns:mc="http://schemas.openxmlformats.org/markup-compatibility/2006">
-            <mc:Choice xmlns:a14="http://schemas.microsoft.com/office/drawing/2010/main" Requires="a14">
+          <mc:AlternateContent xmlns:mc="http://schemas.openxmlformats.org/markup-compatibility/2006" xmlns:a14="http://schemas.microsoft.com/office/drawing/2010/main">
+            <mc:Choice Requires="a14">
               <p:sp>
                 <p:nvSpPr>
                   <p:cNvPr id="99" name="TextBox 98"/>
@@ -24344,7 +26443,7 @@
                 </p:txBody>
               </p:sp>
             </mc:Choice>
-            <mc:Fallback>
+            <mc:Fallback xmlns="">
               <p:sp>
                 <p:nvSpPr>
                   <p:cNvPr id="99" name="TextBox 98"/>
@@ -24453,8 +26552,8 @@
               </a:p>
             </p:txBody>
           </p:sp>
-          <mc:AlternateContent xmlns:mc="http://schemas.openxmlformats.org/markup-compatibility/2006">
-            <mc:Choice xmlns:a14="http://schemas.microsoft.com/office/drawing/2010/main" Requires="a14">
+          <mc:AlternateContent xmlns:mc="http://schemas.openxmlformats.org/markup-compatibility/2006" xmlns:a14="http://schemas.microsoft.com/office/drawing/2010/main">
+            <mc:Choice Requires="a14">
               <p:sp>
                 <p:nvSpPr>
                   <p:cNvPr id="120" name="TextBox 119"/>
@@ -24520,7 +26619,7 @@
                 </p:txBody>
               </p:sp>
             </mc:Choice>
-            <mc:Fallback>
+            <mc:Fallback xmlns="">
               <p:sp>
                 <p:nvSpPr>
                   <p:cNvPr id="120" name="TextBox 119"/>
@@ -24559,8 +26658,8 @@
               </p:sp>
             </mc:Fallback>
           </mc:AlternateContent>
-          <mc:AlternateContent xmlns:mc="http://schemas.openxmlformats.org/markup-compatibility/2006">
-            <mc:Choice xmlns:a14="http://schemas.microsoft.com/office/drawing/2010/main" Requires="a14">
+          <mc:AlternateContent xmlns:mc="http://schemas.openxmlformats.org/markup-compatibility/2006" xmlns:a14="http://schemas.microsoft.com/office/drawing/2010/main">
+            <mc:Choice Requires="a14">
               <p:sp>
                 <p:nvSpPr>
                   <p:cNvPr id="26" name="TextBox 25"/>
@@ -24659,7 +26758,7 @@
                 </p:txBody>
               </p:sp>
             </mc:Choice>
-            <mc:Fallback>
+            <mc:Fallback xmlns="">
               <p:sp>
                 <p:nvSpPr>
                   <p:cNvPr id="26" name="TextBox 25"/>

</xml_diff>